<commit_message>
Adding info.md for Systemd
</commit_message>
<xml_diff>
--- a/10.SystemDAndTheBootProcedure/10-SystemDAndTheBootProcedure.pptx
+++ b/10.SystemDAndTheBootProcedure/10-SystemDAndTheBootProcedure.pptx
@@ -4614,15 +4614,7 @@
                   <a:schemeClr val="accent6"/>
                 </a:solidFill>
               </a:rPr>
-              <a:t> </a:t>
-            </a:r>
-            <a:r>
-              <a:rPr lang="en-US" sz="2000" dirty="0" smtClean="0">
-                <a:solidFill>
-                  <a:schemeClr val="accent6"/>
-                </a:solidFill>
-              </a:rPr>
-              <a:t>is that it provides a uniform interface to start unites. This </a:t>
+              <a:t> is that it provides a uniform interface to start unites. This </a:t>
             </a:r>
             <a:r>
               <a:rPr lang="en-US" sz="2000" dirty="0" err="1" smtClean="0">
@@ -6283,7 +6275,12 @@
             <p:ph type="ctrTitle"/>
           </p:nvPr>
         </p:nvSpPr>
-        <p:spPr/>
+        <p:spPr>
+          <a:xfrm>
+            <a:off x="533400" y="2133600"/>
+            <a:ext cx="7772400" cy="1470025"/>
+          </a:xfrm>
+        </p:spPr>
         <p:txBody>
           <a:bodyPr>
             <a:noAutofit/>

</xml_diff>